<commit_message>
task(9): updated slides [skip-tests]
</commit_message>
<xml_diff>
--- a/tasks/task9/task9_presentation.pptx
+++ b/tasks/task9/task9_presentation.pptx
@@ -220,7 +220,7 @@
           <a:p>
             <a:fld id="{842CE5A1-857B-214D-8BEE-AF65CEFCD544}" type="datetimeFigureOut">
               <a:rPr lang="de-DE" smtClean="0"/>
-              <a:t>11.06.2022</a:t>
+              <a:t>13.06.2022</a:t>
             </a:fld>
             <a:endParaRPr lang="de-DE"/>
           </a:p>
@@ -3695,6 +3695,252 @@
             </a:endParaRPr>
           </a:p>
           <a:p>
+            <a:pPr marL="1257300" lvl="2" indent="-342900" algn="l">
+              <a:lnSpc>
+                <a:spcPct val="150000"/>
+              </a:lnSpc>
+              <a:buFont typeface="Arial" panose="020B0604020202020204" pitchFamily="34" charset="0"/>
+              <a:buChar char="•"/>
+            </a:pPr>
+            <a:r>
+              <a:rPr lang="de-DE" dirty="0" err="1">
+                <a:sym typeface="Wingdings" panose="05000000000000000000" pitchFamily="2" charset="2"/>
+              </a:rPr>
+              <a:t>problems</a:t>
+            </a:r>
+            <a:r>
+              <a:rPr lang="de-DE" dirty="0">
+                <a:sym typeface="Wingdings" panose="05000000000000000000" pitchFamily="2" charset="2"/>
+              </a:rPr>
+              <a:t> </a:t>
+            </a:r>
+            <a:r>
+              <a:rPr lang="de-DE" dirty="0" err="1">
+                <a:sym typeface="Wingdings" panose="05000000000000000000" pitchFamily="2" charset="2"/>
+              </a:rPr>
+              <a:t>when</a:t>
+            </a:r>
+            <a:r>
+              <a:rPr lang="de-DE" dirty="0">
+                <a:sym typeface="Wingdings" panose="05000000000000000000" pitchFamily="2" charset="2"/>
+              </a:rPr>
+              <a:t> </a:t>
+            </a:r>
+            <a:r>
+              <a:rPr lang="de-DE" dirty="0" err="1">
+                <a:sym typeface="Wingdings" panose="05000000000000000000" pitchFamily="2" charset="2"/>
+              </a:rPr>
+              <a:t>schema</a:t>
+            </a:r>
+            <a:r>
+              <a:rPr lang="de-DE" dirty="0">
+                <a:sym typeface="Wingdings" panose="05000000000000000000" pitchFamily="2" charset="2"/>
+              </a:rPr>
+              <a:t> </a:t>
+            </a:r>
+            <a:r>
+              <a:rPr lang="de-DE" dirty="0" err="1">
+                <a:sym typeface="Wingdings" panose="05000000000000000000" pitchFamily="2" charset="2"/>
+              </a:rPr>
+              <a:t>contains</a:t>
+            </a:r>
+            <a:r>
+              <a:rPr lang="de-DE" dirty="0">
+                <a:sym typeface="Wingdings" panose="05000000000000000000" pitchFamily="2" charset="2"/>
+              </a:rPr>
+              <a:t> </a:t>
+            </a:r>
+            <a:r>
+              <a:rPr lang="de-DE" dirty="0" err="1">
+                <a:sym typeface="Wingdings" panose="05000000000000000000" pitchFamily="2" charset="2"/>
+              </a:rPr>
+              <a:t>indices</a:t>
+            </a:r>
+            <a:r>
+              <a:rPr lang="de-DE" dirty="0">
+                <a:sym typeface="Wingdings" panose="05000000000000000000" pitchFamily="2" charset="2"/>
+              </a:rPr>
+              <a:t> </a:t>
+            </a:r>
+            <a:r>
+              <a:rPr lang="de-DE" dirty="0" err="1">
+                <a:sym typeface="Wingdings" panose="05000000000000000000" pitchFamily="2" charset="2"/>
+              </a:rPr>
+              <a:t>that</a:t>
+            </a:r>
+            <a:r>
+              <a:rPr lang="de-DE" dirty="0">
+                <a:sym typeface="Wingdings" panose="05000000000000000000" pitchFamily="2" charset="2"/>
+              </a:rPr>
+              <a:t> </a:t>
+            </a:r>
+            <a:r>
+              <a:rPr lang="de-DE" dirty="0" err="1">
+                <a:sym typeface="Wingdings" panose="05000000000000000000" pitchFamily="2" charset="2"/>
+              </a:rPr>
+              <a:t>have</a:t>
+            </a:r>
+            <a:r>
+              <a:rPr lang="de-DE" dirty="0">
+                <a:sym typeface="Wingdings" panose="05000000000000000000" pitchFamily="2" charset="2"/>
+              </a:rPr>
+              <a:t> </a:t>
+            </a:r>
+            <a:r>
+              <a:rPr lang="de-DE" dirty="0" err="1">
+                <a:sym typeface="Wingdings" panose="05000000000000000000" pitchFamily="2" charset="2"/>
+              </a:rPr>
+              <a:t>more</a:t>
+            </a:r>
+            <a:r>
+              <a:rPr lang="de-DE" dirty="0">
+                <a:sym typeface="Wingdings" panose="05000000000000000000" pitchFamily="2" charset="2"/>
+              </a:rPr>
+              <a:t> </a:t>
+            </a:r>
+            <a:r>
+              <a:rPr lang="de-DE" dirty="0" err="1">
+                <a:sym typeface="Wingdings" panose="05000000000000000000" pitchFamily="2" charset="2"/>
+              </a:rPr>
+              <a:t>than</a:t>
+            </a:r>
+            <a:r>
+              <a:rPr lang="de-DE" dirty="0">
+                <a:sym typeface="Wingdings" panose="05000000000000000000" pitchFamily="2" charset="2"/>
+              </a:rPr>
+              <a:t> </a:t>
+            </a:r>
+            <a:r>
+              <a:rPr lang="de-DE" dirty="0" err="1">
+                <a:sym typeface="Wingdings" panose="05000000000000000000" pitchFamily="2" charset="2"/>
+              </a:rPr>
+              <a:t>about</a:t>
+            </a:r>
+            <a:r>
+              <a:rPr lang="de-DE" dirty="0">
+                <a:sym typeface="Wingdings" panose="05000000000000000000" pitchFamily="2" charset="2"/>
+              </a:rPr>
+              <a:t> 10 </a:t>
+            </a:r>
+            <a:r>
+              <a:rPr lang="de-DE" dirty="0" err="1">
+                <a:sym typeface="Wingdings" panose="05000000000000000000" pitchFamily="2" charset="2"/>
+              </a:rPr>
+              <a:t>or</a:t>
+            </a:r>
+            <a:r>
+              <a:rPr lang="de-DE" dirty="0">
+                <a:sym typeface="Wingdings" panose="05000000000000000000" pitchFamily="2" charset="2"/>
+              </a:rPr>
+              <a:t> 20 </a:t>
+            </a:r>
+            <a:r>
+              <a:rPr lang="de-DE" dirty="0" err="1">
+                <a:sym typeface="Wingdings" panose="05000000000000000000" pitchFamily="2" charset="2"/>
+              </a:rPr>
+              <a:t>rows</a:t>
+            </a:r>
+            <a:r>
+              <a:rPr lang="de-DE" dirty="0">
+                <a:sym typeface="Wingdings" panose="05000000000000000000" pitchFamily="2" charset="2"/>
+              </a:rPr>
+              <a:t> </a:t>
+            </a:r>
+            <a:r>
+              <a:rPr lang="de-DE" dirty="0" err="1">
+                <a:sym typeface="Wingdings" panose="05000000000000000000" pitchFamily="2" charset="2"/>
+              </a:rPr>
+              <a:t>with</a:t>
+            </a:r>
+            <a:r>
+              <a:rPr lang="de-DE" dirty="0">
+                <a:sym typeface="Wingdings" panose="05000000000000000000" pitchFamily="2" charset="2"/>
+              </a:rPr>
+              <a:t> </a:t>
+            </a:r>
+            <a:r>
+              <a:rPr lang="de-DE" dirty="0" err="1">
+                <a:sym typeface="Wingdings" panose="05000000000000000000" pitchFamily="2" charset="2"/>
+              </a:rPr>
+              <a:t>the</a:t>
+            </a:r>
+            <a:r>
+              <a:rPr lang="de-DE" dirty="0">
+                <a:sym typeface="Wingdings" panose="05000000000000000000" pitchFamily="2" charset="2"/>
+              </a:rPr>
+              <a:t> same </a:t>
+            </a:r>
+            <a:r>
+              <a:rPr lang="de-DE" dirty="0" err="1">
+                <a:sym typeface="Wingdings" panose="05000000000000000000" pitchFamily="2" charset="2"/>
+              </a:rPr>
+              <a:t>value</a:t>
+            </a:r>
+            <a:r>
+              <a:rPr lang="de-DE" dirty="0">
+                <a:sym typeface="Wingdings" panose="05000000000000000000" pitchFamily="2" charset="2"/>
+              </a:rPr>
+              <a:t> in </a:t>
+            </a:r>
+            <a:r>
+              <a:rPr lang="de-DE" dirty="0" err="1">
+                <a:sym typeface="Wingdings" panose="05000000000000000000" pitchFamily="2" charset="2"/>
+              </a:rPr>
+              <a:t>the</a:t>
+            </a:r>
+            <a:r>
+              <a:rPr lang="de-DE" dirty="0">
+                <a:sym typeface="Wingdings" panose="05000000000000000000" pitchFamily="2" charset="2"/>
+              </a:rPr>
+              <a:t> </a:t>
+            </a:r>
+            <a:r>
+              <a:rPr lang="de-DE" dirty="0" err="1">
+                <a:sym typeface="Wingdings" panose="05000000000000000000" pitchFamily="2" charset="2"/>
+              </a:rPr>
+              <a:t>left</a:t>
+            </a:r>
+            <a:r>
+              <a:rPr lang="de-DE" dirty="0">
+                <a:sym typeface="Wingdings" panose="05000000000000000000" pitchFamily="2" charset="2"/>
+              </a:rPr>
+              <a:t>-most </a:t>
+            </a:r>
+            <a:r>
+              <a:rPr lang="de-DE" dirty="0" err="1">
+                <a:sym typeface="Wingdings" panose="05000000000000000000" pitchFamily="2" charset="2"/>
+              </a:rPr>
+              <a:t>column</a:t>
+            </a:r>
+            <a:r>
+              <a:rPr lang="de-DE" dirty="0">
+                <a:sym typeface="Wingdings" panose="05000000000000000000" pitchFamily="2" charset="2"/>
+              </a:rPr>
+              <a:t> </a:t>
+            </a:r>
+            <a:r>
+              <a:rPr lang="de-DE" dirty="0" err="1">
+                <a:sym typeface="Wingdings" panose="05000000000000000000" pitchFamily="2" charset="2"/>
+              </a:rPr>
+              <a:t>of</a:t>
+            </a:r>
+            <a:r>
+              <a:rPr lang="de-DE" dirty="0">
+                <a:sym typeface="Wingdings" panose="05000000000000000000" pitchFamily="2" charset="2"/>
+              </a:rPr>
+              <a:t> </a:t>
+            </a:r>
+            <a:r>
+              <a:rPr lang="de-DE" dirty="0" err="1">
+                <a:sym typeface="Wingdings" panose="05000000000000000000" pitchFamily="2" charset="2"/>
+              </a:rPr>
+              <a:t>index</a:t>
+            </a:r>
+            <a:endParaRPr lang="de-DE" dirty="0">
+              <a:sym typeface="Wingdings" panose="05000000000000000000" pitchFamily="2" charset="2"/>
+            </a:endParaRPr>
+          </a:p>
+          <a:p>
             <a:pPr marL="800100" lvl="1" indent="-342900" algn="l">
               <a:lnSpc>
                 <a:spcPct val="250000"/>
@@ -4155,6 +4401,30 @@
                 <a:sym typeface="Wingdings" panose="05000000000000000000" pitchFamily="2" charset="2"/>
               </a:rPr>
               <a:t> in a </a:t>
+            </a:r>
+            <a:r>
+              <a:rPr lang="de-DE" sz="2400" dirty="0" err="1">
+                <a:sym typeface="Wingdings" panose="05000000000000000000" pitchFamily="2" charset="2"/>
+              </a:rPr>
+              <a:t>weighted</a:t>
+            </a:r>
+            <a:r>
+              <a:rPr lang="de-DE" sz="2400" dirty="0">
+                <a:sym typeface="Wingdings" panose="05000000000000000000" pitchFamily="2" charset="2"/>
+              </a:rPr>
+              <a:t>, </a:t>
+            </a:r>
+            <a:r>
+              <a:rPr lang="de-DE" sz="2400" dirty="0" err="1">
+                <a:sym typeface="Wingdings" panose="05000000000000000000" pitchFamily="2" charset="2"/>
+              </a:rPr>
+              <a:t>directed</a:t>
+            </a:r>
+            <a:r>
+              <a:rPr lang="de-DE" sz="2400" dirty="0">
+                <a:sym typeface="Wingdings" panose="05000000000000000000" pitchFamily="2" charset="2"/>
+              </a:rPr>
+              <a:t> </a:t>
             </a:r>
             <a:r>
               <a:rPr lang="de-DE" sz="2400" dirty="0" err="1">

</xml_diff>